<commit_message>
Corrections on NVC presentation.
</commit_message>
<xml_diff>
--- a/presentations/nvc.pptx
+++ b/presentations/nvc.pptx
@@ -1037,7 +1037,7 @@
           <a:p>
             <a:fld id="{B01F9CA3-105E-4857-9057-6DB6197DA786}" type="datetimeFigureOut">
               <a:rPr lang="en-US" smtClean="0"/>
-              <a:t>10/17/16</a:t>
+              <a:t>10/18/16</a:t>
             </a:fld>
             <a:endParaRPr lang="en-US"/>
           </a:p>
@@ -1229,7 +1229,7 @@
           <a:p>
             <a:fld id="{B01F9CA3-105E-4857-9057-6DB6197DA786}" type="datetimeFigureOut">
               <a:rPr lang="en-US" smtClean="0"/>
-              <a:t>10/17/16</a:t>
+              <a:t>10/18/16</a:t>
             </a:fld>
             <a:endParaRPr lang="en-US"/>
           </a:p>
@@ -1498,7 +1498,7 @@
           <a:p>
             <a:fld id="{B01F9CA3-105E-4857-9057-6DB6197DA786}" type="datetimeFigureOut">
               <a:rPr lang="en-US" smtClean="0"/>
-              <a:t>10/17/16</a:t>
+              <a:t>10/18/16</a:t>
             </a:fld>
             <a:endParaRPr lang="en-US"/>
           </a:p>
@@ -1677,7 +1677,7 @@
           <a:p>
             <a:fld id="{B01F9CA3-105E-4857-9057-6DB6197DA786}" type="datetimeFigureOut">
               <a:rPr lang="en-US" smtClean="0"/>
-              <a:t>10/17/16</a:t>
+              <a:t>10/18/16</a:t>
             </a:fld>
             <a:endParaRPr lang="en-US"/>
           </a:p>
@@ -1846,7 +1846,7 @@
           <a:p>
             <a:fld id="{B01F9CA3-105E-4857-9057-6DB6197DA786}" type="datetimeFigureOut">
               <a:rPr lang="en-US" smtClean="0"/>
-              <a:t>10/17/16</a:t>
+              <a:t>10/18/16</a:t>
             </a:fld>
             <a:endParaRPr lang="en-US"/>
           </a:p>
@@ -2088,7 +2088,7 @@
           <a:p>
             <a:fld id="{B01F9CA3-105E-4857-9057-6DB6197DA786}" type="datetimeFigureOut">
               <a:rPr lang="en-US" smtClean="0"/>
-              <a:t>10/17/16</a:t>
+              <a:t>10/18/16</a:t>
             </a:fld>
             <a:endParaRPr lang="en-US"/>
           </a:p>
@@ -2411,7 +2411,7 @@
           <a:p>
             <a:fld id="{B01F9CA3-105E-4857-9057-6DB6197DA786}" type="datetimeFigureOut">
               <a:rPr lang="en-US" smtClean="0"/>
-              <a:t>10/17/16</a:t>
+              <a:t>10/18/16</a:t>
             </a:fld>
             <a:endParaRPr lang="en-US"/>
           </a:p>
@@ -2709,7 +2709,7 @@
           <a:p>
             <a:fld id="{B01F9CA3-105E-4857-9057-6DB6197DA786}" type="datetimeFigureOut">
               <a:rPr lang="en-US" smtClean="0"/>
-              <a:t>10/17/16</a:t>
+              <a:t>10/18/16</a:t>
             </a:fld>
             <a:endParaRPr lang="en-US"/>
           </a:p>
@@ -3165,7 +3165,7 @@
           <a:p>
             <a:fld id="{B01F9CA3-105E-4857-9057-6DB6197DA786}" type="datetimeFigureOut">
               <a:rPr lang="en-US" smtClean="0"/>
-              <a:t>10/17/16</a:t>
+              <a:t>10/18/16</a:t>
             </a:fld>
             <a:endParaRPr lang="en-US"/>
           </a:p>
@@ -3278,7 +3278,7 @@
           <a:p>
             <a:fld id="{B01F9CA3-105E-4857-9057-6DB6197DA786}" type="datetimeFigureOut">
               <a:rPr lang="en-US" smtClean="0"/>
-              <a:t>10/17/16</a:t>
+              <a:t>10/18/16</a:t>
             </a:fld>
             <a:endParaRPr lang="en-US"/>
           </a:p>
@@ -3368,7 +3368,7 @@
           <a:p>
             <a:fld id="{B01F9CA3-105E-4857-9057-6DB6197DA786}" type="datetimeFigureOut">
               <a:rPr lang="en-US" smtClean="0"/>
-              <a:t>10/17/16</a:t>
+              <a:t>10/18/16</a:t>
             </a:fld>
             <a:endParaRPr lang="en-US"/>
           </a:p>
@@ -3650,7 +3650,7 @@
           <a:p>
             <a:fld id="{B01F9CA3-105E-4857-9057-6DB6197DA786}" type="datetimeFigureOut">
               <a:rPr lang="en-US" smtClean="0"/>
-              <a:t>10/17/16</a:t>
+              <a:t>10/18/16</a:t>
             </a:fld>
             <a:endParaRPr lang="en-US"/>
           </a:p>
@@ -3856,7 +3856,7 @@
           <a:p>
             <a:fld id="{B01F9CA3-105E-4857-9057-6DB6197DA786}" type="datetimeFigureOut">
               <a:rPr lang="en-US" smtClean="0"/>
-              <a:t>10/17/16</a:t>
+              <a:t>10/18/16</a:t>
             </a:fld>
             <a:endParaRPr lang="en-US"/>
           </a:p>
@@ -4609,7 +4609,6 @@
               <a:rPr lang="en-US" dirty="0"/>
               <a:t> </a:t>
             </a:r>
-            <a:endParaRPr lang="en-US" dirty="0"/>
           </a:p>
         </p:txBody>
       </p:sp>
@@ -5716,7 +5715,47 @@
                   <a:srgbClr val="5F8804"/>
                 </a:solidFill>
               </a:rPr>
-              <a:t>I see magazines, socks, and food on the floor, and these pots and dirty dishes in the </a:t>
+              <a:t>I see magazines, </a:t>
+            </a:r>
+            <a:r>
+              <a:rPr lang="en-US" dirty="0" smtClean="0">
+                <a:solidFill>
+                  <a:srgbClr val="5F8804"/>
+                </a:solidFill>
+              </a:rPr>
+              <a:t>clothes, </a:t>
+            </a:r>
+            <a:r>
+              <a:rPr lang="en-US" dirty="0">
+                <a:solidFill>
+                  <a:srgbClr val="5F8804"/>
+                </a:solidFill>
+              </a:rPr>
+              <a:t>and food on the floor, </a:t>
+            </a:r>
+            <a:r>
+              <a:rPr lang="en-US">
+                <a:solidFill>
+                  <a:srgbClr val="5F8804"/>
+                </a:solidFill>
+              </a:rPr>
+              <a:t>and </a:t>
+            </a:r>
+            <a:r>
+              <a:rPr lang="en-US" smtClean="0">
+                <a:solidFill>
+                  <a:srgbClr val="5F8804"/>
+                </a:solidFill>
+              </a:rPr>
+              <a:t>dirty </a:t>
+            </a:r>
+            <a:r>
+              <a:rPr lang="en-US" dirty="0">
+                <a:solidFill>
+                  <a:srgbClr val="5F8804"/>
+                </a:solidFill>
+              </a:rPr>
+              <a:t>dishes in the </a:t>
             </a:r>
             <a:r>
               <a:rPr lang="en-US" dirty="0" smtClean="0">

</xml_diff>